<commit_message>
Added images to slides
</commit_message>
<xml_diff>
--- a/presentation/AVP Final Presentation.pptx
+++ b/presentation/AVP Final Presentation.pptx
@@ -809,7 +809,7 @@
           <a:p>
             <a:fld id="{199C758D-130B-49D3-B600-9B5FF945A439}" type="datetimeFigureOut">
               <a:rPr lang="en-GB" smtClean="0"/>
-              <a:t>26/04/2017</a:t>
+              <a:t>27/04/2017</a:t>
             </a:fld>
             <a:endParaRPr lang="en-GB"/>
           </a:p>
@@ -1970,7 +1970,7 @@
           <a:p>
             <a:fld id="{199C758D-130B-49D3-B600-9B5FF945A439}" type="datetimeFigureOut">
               <a:rPr lang="en-GB" smtClean="0"/>
-              <a:t>26/04/2017</a:t>
+              <a:t>27/04/2017</a:t>
             </a:fld>
             <a:endParaRPr lang="en-GB"/>
           </a:p>
@@ -3024,7 +3024,7 @@
           <a:p>
             <a:fld id="{199C758D-130B-49D3-B600-9B5FF945A439}" type="datetimeFigureOut">
               <a:rPr lang="en-GB" smtClean="0"/>
-              <a:t>26/04/2017</a:t>
+              <a:t>27/04/2017</a:t>
             </a:fld>
             <a:endParaRPr lang="en-GB"/>
           </a:p>
@@ -4237,7 +4237,7 @@
           <a:p>
             <a:fld id="{199C758D-130B-49D3-B600-9B5FF945A439}" type="datetimeFigureOut">
               <a:rPr lang="en-GB" smtClean="0"/>
-              <a:t>26/04/2017</a:t>
+              <a:t>27/04/2017</a:t>
             </a:fld>
             <a:endParaRPr lang="en-GB"/>
           </a:p>
@@ -5341,7 +5341,7 @@
           <a:p>
             <a:fld id="{199C758D-130B-49D3-B600-9B5FF945A439}" type="datetimeFigureOut">
               <a:rPr lang="en-GB" smtClean="0"/>
-              <a:t>26/04/2017</a:t>
+              <a:t>27/04/2017</a:t>
             </a:fld>
             <a:endParaRPr lang="en-GB"/>
           </a:p>
@@ -5993,7 +5993,7 @@
           <a:p>
             <a:fld id="{199C758D-130B-49D3-B600-9B5FF945A439}" type="datetimeFigureOut">
               <a:rPr lang="en-GB" smtClean="0"/>
-              <a:t>26/04/2017</a:t>
+              <a:t>27/04/2017</a:t>
             </a:fld>
             <a:endParaRPr lang="en-GB"/>
           </a:p>
@@ -6840,7 +6840,7 @@
           <a:p>
             <a:fld id="{199C758D-130B-49D3-B600-9B5FF945A439}" type="datetimeFigureOut">
               <a:rPr lang="en-GB" smtClean="0"/>
-              <a:t>26/04/2017</a:t>
+              <a:t>27/04/2017</a:t>
             </a:fld>
             <a:endParaRPr lang="en-GB"/>
           </a:p>
@@ -7025,7 +7025,7 @@
           <a:p>
             <a:fld id="{199C758D-130B-49D3-B600-9B5FF945A439}" type="datetimeFigureOut">
               <a:rPr lang="en-GB" smtClean="0"/>
-              <a:t>26/04/2017</a:t>
+              <a:t>27/04/2017</a:t>
             </a:fld>
             <a:endParaRPr lang="en-GB"/>
           </a:p>
@@ -8066,7 +8066,7 @@
           <a:p>
             <a:fld id="{199C758D-130B-49D3-B600-9B5FF945A439}" type="datetimeFigureOut">
               <a:rPr lang="en-GB" smtClean="0"/>
-              <a:t>26/04/2017</a:t>
+              <a:t>27/04/2017</a:t>
             </a:fld>
             <a:endParaRPr lang="en-GB"/>
           </a:p>
@@ -8282,7 +8282,7 @@
           <a:p>
             <a:fld id="{199C758D-130B-49D3-B600-9B5FF945A439}" type="datetimeFigureOut">
               <a:rPr lang="en-GB" smtClean="0"/>
-              <a:t>26/04/2017</a:t>
+              <a:t>27/04/2017</a:t>
             </a:fld>
             <a:endParaRPr lang="en-GB"/>
           </a:p>
@@ -9387,7 +9387,7 @@
           <a:p>
             <a:fld id="{199C758D-130B-49D3-B600-9B5FF945A439}" type="datetimeFigureOut">
               <a:rPr lang="en-GB" smtClean="0"/>
-              <a:t>26/04/2017</a:t>
+              <a:t>27/04/2017</a:t>
             </a:fld>
             <a:endParaRPr lang="en-GB"/>
           </a:p>
@@ -9659,7 +9659,7 @@
           <a:p>
             <a:fld id="{199C758D-130B-49D3-B600-9B5FF945A439}" type="datetimeFigureOut">
               <a:rPr lang="en-GB" smtClean="0"/>
-              <a:t>26/04/2017</a:t>
+              <a:t>27/04/2017</a:t>
             </a:fld>
             <a:endParaRPr lang="en-GB"/>
           </a:p>
@@ -10041,7 +10041,7 @@
           <a:p>
             <a:fld id="{199C758D-130B-49D3-B600-9B5FF945A439}" type="datetimeFigureOut">
               <a:rPr lang="en-GB" smtClean="0"/>
-              <a:t>26/04/2017</a:t>
+              <a:t>27/04/2017</a:t>
             </a:fld>
             <a:endParaRPr lang="en-GB"/>
           </a:p>
@@ -10159,7 +10159,7 @@
           <a:p>
             <a:fld id="{199C758D-130B-49D3-B600-9B5FF945A439}" type="datetimeFigureOut">
               <a:rPr lang="en-GB" smtClean="0"/>
-              <a:t>26/04/2017</a:t>
+              <a:t>27/04/2017</a:t>
             </a:fld>
             <a:endParaRPr lang="en-GB"/>
           </a:p>
@@ -10254,7 +10254,7 @@
           <a:p>
             <a:fld id="{199C758D-130B-49D3-B600-9B5FF945A439}" type="datetimeFigureOut">
               <a:rPr lang="en-GB" smtClean="0"/>
-              <a:t>26/04/2017</a:t>
+              <a:t>27/04/2017</a:t>
             </a:fld>
             <a:endParaRPr lang="en-GB"/>
           </a:p>
@@ -11406,7 +11406,7 @@
           <a:p>
             <a:fld id="{199C758D-130B-49D3-B600-9B5FF945A439}" type="datetimeFigureOut">
               <a:rPr lang="en-GB" smtClean="0"/>
-              <a:t>26/04/2017</a:t>
+              <a:t>27/04/2017</a:t>
             </a:fld>
             <a:endParaRPr lang="en-GB"/>
           </a:p>
@@ -12582,7 +12582,7 @@
           <a:p>
             <a:fld id="{199C758D-130B-49D3-B600-9B5FF945A439}" type="datetimeFigureOut">
               <a:rPr lang="en-GB" smtClean="0"/>
-              <a:t>26/04/2017</a:t>
+              <a:t>27/04/2017</a:t>
             </a:fld>
             <a:endParaRPr lang="en-GB"/>
           </a:p>
@@ -13688,7 +13688,7 @@
           <a:p>
             <a:fld id="{199C758D-130B-49D3-B600-9B5FF945A439}" type="datetimeFigureOut">
               <a:rPr lang="en-GB" smtClean="0"/>
-              <a:t>26/04/2017</a:t>
+              <a:t>27/04/2017</a:t>
             </a:fld>
             <a:endParaRPr lang="en-GB"/>
           </a:p>
@@ -14384,6 +14384,30 @@
           </a:p>
         </p:txBody>
       </p:sp>
+      <p:pic>
+        <p:nvPicPr>
+          <p:cNvPr id="3" name="Picture 2"/>
+          <p:cNvPicPr>
+            <a:picLocks noChangeAspect="1"/>
+          </p:cNvPicPr>
+          <p:nvPr/>
+        </p:nvPicPr>
+        <p:blipFill>
+          <a:blip r:embed="rId2"/>
+          <a:stretch>
+            <a:fillRect/>
+          </a:stretch>
+        </p:blipFill>
+        <p:spPr>
+          <a:xfrm>
+            <a:off x="7666673" y="3506894"/>
+            <a:ext cx="3938588" cy="2372888"/>
+          </a:xfrm>
+          <a:prstGeom prst="rect">
+            <a:avLst/>
+          </a:prstGeom>
+        </p:spPr>
+      </p:pic>
     </p:spTree>
     <p:extLst>
       <p:ext uri="{BB962C8B-B14F-4D97-AF65-F5344CB8AC3E}">
@@ -14511,6 +14535,47 @@
           </a:p>
         </p:txBody>
       </p:sp>
+      <p:pic>
+        <p:nvPicPr>
+          <p:cNvPr id="1026" name="Picture 2" descr="https://4.bp.blogspot.com/-Eyq3nXK0Tmk/VzyOMr7q23I/AAAAAAAAFAg/MoKBUzW67gIxEkBs256pQQzgdHW4BMjUACLcB/s1600/worldbuilding.jpg"/>
+          <p:cNvPicPr>
+            <a:picLocks noChangeAspect="1" noChangeArrowheads="1"/>
+          </p:cNvPicPr>
+          <p:nvPr/>
+        </p:nvPicPr>
+        <p:blipFill>
+          <a:blip r:embed="rId2" cstate="print">
+            <a:extLst>
+              <a:ext uri="{28A0092B-C50C-407E-A947-70E740481C1C}">
+                <a14:useLocalDpi xmlns:a14="http://schemas.microsoft.com/office/drawing/2010/main" val="0"/>
+              </a:ext>
+            </a:extLst>
+          </a:blip>
+          <a:srcRect/>
+          <a:stretch>
+            <a:fillRect/>
+          </a:stretch>
+        </p:blipFill>
+        <p:spPr bwMode="auto">
+          <a:xfrm>
+            <a:off x="7010249" y="3821064"/>
+            <a:ext cx="4416725" cy="2483258"/>
+          </a:xfrm>
+          <a:prstGeom prst="rect">
+            <a:avLst/>
+          </a:prstGeom>
+          <a:noFill/>
+          <a:extLst>
+            <a:ext uri="{909E8E84-426E-40DD-AFC4-6F175D3DCCD1}">
+              <a14:hiddenFill xmlns:a14="http://schemas.microsoft.com/office/drawing/2010/main">
+                <a:solidFill>
+                  <a:srgbClr val="FFFFFF"/>
+                </a:solidFill>
+              </a14:hiddenFill>
+            </a:ext>
+          </a:extLst>
+        </p:spPr>
+      </p:pic>
     </p:spTree>
     <p:extLst>
       <p:ext uri="{BB962C8B-B14F-4D97-AF65-F5344CB8AC3E}">
@@ -14648,6 +14713,47 @@
           </a:p>
         </p:txBody>
       </p:sp>
+      <p:pic>
+        <p:nvPicPr>
+          <p:cNvPr id="2050" name="Picture 2" descr="Image result for post apocalyptic"/>
+          <p:cNvPicPr>
+            <a:picLocks noChangeAspect="1" noChangeArrowheads="1"/>
+          </p:cNvPicPr>
+          <p:nvPr/>
+        </p:nvPicPr>
+        <p:blipFill>
+          <a:blip r:embed="rId2" cstate="print">
+            <a:extLst>
+              <a:ext uri="{28A0092B-C50C-407E-A947-70E740481C1C}">
+                <a14:useLocalDpi xmlns:a14="http://schemas.microsoft.com/office/drawing/2010/main" val="0"/>
+              </a:ext>
+            </a:extLst>
+          </a:blip>
+          <a:srcRect/>
+          <a:stretch>
+            <a:fillRect/>
+          </a:stretch>
+        </p:blipFill>
+        <p:spPr bwMode="auto">
+          <a:xfrm>
+            <a:off x="6986248" y="3968151"/>
+            <a:ext cx="4645035" cy="2594083"/>
+          </a:xfrm>
+          <a:prstGeom prst="rect">
+            <a:avLst/>
+          </a:prstGeom>
+          <a:noFill/>
+          <a:extLst>
+            <a:ext uri="{909E8E84-426E-40DD-AFC4-6F175D3DCCD1}">
+              <a14:hiddenFill xmlns:a14="http://schemas.microsoft.com/office/drawing/2010/main">
+                <a:solidFill>
+                  <a:srgbClr val="FFFFFF"/>
+                </a:solidFill>
+              </a14:hiddenFill>
+            </a:ext>
+          </a:extLst>
+        </p:spPr>
+      </p:pic>
     </p:spTree>
     <p:extLst>
       <p:ext uri="{BB962C8B-B14F-4D97-AF65-F5344CB8AC3E}">
@@ -14768,6 +14874,45 @@
           </a:p>
         </p:txBody>
       </p:sp>
+      <p:pic>
+        <p:nvPicPr>
+          <p:cNvPr id="3074" name="Picture 2" descr="Image result for shadowrun"/>
+          <p:cNvPicPr>
+            <a:picLocks noChangeAspect="1" noChangeArrowheads="1"/>
+          </p:cNvPicPr>
+          <p:nvPr/>
+        </p:nvPicPr>
+        <p:blipFill rotWithShape="1">
+          <a:blip r:embed="rId2">
+            <a:extLst>
+              <a:ext uri="{28A0092B-C50C-407E-A947-70E740481C1C}">
+                <a14:useLocalDpi xmlns:a14="http://schemas.microsoft.com/office/drawing/2010/main" val="0"/>
+              </a:ext>
+            </a:extLst>
+          </a:blip>
+          <a:srcRect b="11540"/>
+          <a:stretch/>
+        </p:blipFill>
+        <p:spPr bwMode="auto">
+          <a:xfrm>
+            <a:off x="7202456" y="3163542"/>
+            <a:ext cx="4391445" cy="2909454"/>
+          </a:xfrm>
+          <a:prstGeom prst="rect">
+            <a:avLst/>
+          </a:prstGeom>
+          <a:noFill/>
+          <a:extLst>
+            <a:ext uri="{909E8E84-426E-40DD-AFC4-6F175D3DCCD1}">
+              <a14:hiddenFill xmlns:a14="http://schemas.microsoft.com/office/drawing/2010/main">
+                <a:solidFill>
+                  <a:srgbClr val="FFFFFF"/>
+                </a:solidFill>
+              </a14:hiddenFill>
+            </a:ext>
+          </a:extLst>
+        </p:spPr>
+      </p:pic>
     </p:spTree>
     <p:extLst>
       <p:ext uri="{BB962C8B-B14F-4D97-AF65-F5344CB8AC3E}">
@@ -14888,6 +15033,30 @@
           </a:p>
         </p:txBody>
       </p:sp>
+      <p:pic>
+        <p:nvPicPr>
+          <p:cNvPr id="3" name="Picture 2"/>
+          <p:cNvPicPr>
+            <a:picLocks noChangeAspect="1"/>
+          </p:cNvPicPr>
+          <p:nvPr/>
+        </p:nvPicPr>
+        <p:blipFill>
+          <a:blip r:embed="rId2"/>
+          <a:stretch>
+            <a:fillRect/>
+          </a:stretch>
+        </p:blipFill>
+        <p:spPr>
+          <a:xfrm>
+            <a:off x="7002037" y="3843414"/>
+            <a:ext cx="4911042" cy="2773045"/>
+          </a:xfrm>
+          <a:prstGeom prst="rect">
+            <a:avLst/>
+          </a:prstGeom>
+        </p:spPr>
+      </p:pic>
     </p:spTree>
     <p:extLst>
       <p:ext uri="{BB962C8B-B14F-4D97-AF65-F5344CB8AC3E}">
@@ -15005,6 +15174,296 @@
               <a:rPr lang="en-GB" dirty="0"/>
               <a:t>We did keep to schedule and we did work well after our initial problems</a:t>
             </a:r>
+          </a:p>
+        </p:txBody>
+      </p:sp>
+      <p:pic>
+        <p:nvPicPr>
+          <p:cNvPr id="4098" name="Picture 2" descr="https://img.clipartfest.com/b0d45c98d99d8f49afb15d3fca5656a6_pictures-of-communication-no-communication-clipart_339-200.jpeg"/>
+          <p:cNvPicPr>
+            <a:picLocks noChangeAspect="1" noChangeArrowheads="1"/>
+          </p:cNvPicPr>
+          <p:nvPr/>
+        </p:nvPicPr>
+        <p:blipFill rotWithShape="1">
+          <a:blip r:embed="rId2">
+            <a:extLst>
+              <a:ext uri="{28A0092B-C50C-407E-A947-70E740481C1C}">
+                <a14:useLocalDpi xmlns:a14="http://schemas.microsoft.com/office/drawing/2010/main" val="0"/>
+              </a:ext>
+            </a:extLst>
+          </a:blip>
+          <a:srcRect r="64605"/>
+          <a:stretch/>
+        </p:blipFill>
+        <p:spPr bwMode="auto">
+          <a:xfrm>
+            <a:off x="8760215" y="4495082"/>
+            <a:ext cx="1142910" cy="1905000"/>
+          </a:xfrm>
+          <a:prstGeom prst="rect">
+            <a:avLst/>
+          </a:prstGeom>
+          <a:noFill/>
+          <a:extLst>
+            <a:ext uri="{909E8E84-426E-40DD-AFC4-6F175D3DCCD1}">
+              <a14:hiddenFill xmlns:a14="http://schemas.microsoft.com/office/drawing/2010/main">
+                <a:solidFill>
+                  <a:srgbClr val="FFFFFF"/>
+                </a:solidFill>
+              </a14:hiddenFill>
+            </a:ext>
+          </a:extLst>
+        </p:spPr>
+      </p:pic>
+      <p:pic>
+        <p:nvPicPr>
+          <p:cNvPr id="4100" name="Picture 4" descr="https://img.clipartfest.com/b0d45c98d99d8f49afb15d3fca5656a6_pictures-of-communication-no-communication-clipart_339-200.jpeg"/>
+          <p:cNvPicPr>
+            <a:picLocks noChangeAspect="1" noChangeArrowheads="1"/>
+          </p:cNvPicPr>
+          <p:nvPr/>
+        </p:nvPicPr>
+        <p:blipFill rotWithShape="1">
+          <a:blip r:embed="rId2">
+            <a:extLst>
+              <a:ext uri="{28A0092B-C50C-407E-A947-70E740481C1C}">
+                <a14:useLocalDpi xmlns:a14="http://schemas.microsoft.com/office/drawing/2010/main" val="0"/>
+              </a:ext>
+            </a:extLst>
+          </a:blip>
+          <a:srcRect l="61577"/>
+          <a:stretch/>
+        </p:blipFill>
+        <p:spPr bwMode="auto">
+          <a:xfrm>
+            <a:off x="10748513" y="4495082"/>
+            <a:ext cx="1240677" cy="1905000"/>
+          </a:xfrm>
+          <a:prstGeom prst="rect">
+            <a:avLst/>
+          </a:prstGeom>
+          <a:noFill/>
+          <a:extLst>
+            <a:ext uri="{909E8E84-426E-40DD-AFC4-6F175D3DCCD1}">
+              <a14:hiddenFill xmlns:a14="http://schemas.microsoft.com/office/drawing/2010/main">
+                <a:solidFill>
+                  <a:srgbClr val="FFFFFF"/>
+                </a:solidFill>
+              </a14:hiddenFill>
+            </a:ext>
+          </a:extLst>
+        </p:spPr>
+      </p:pic>
+      <p:sp>
+        <p:nvSpPr>
+          <p:cNvPr id="3" name="Freeform: Shape 2"/>
+          <p:cNvSpPr/>
+          <p:nvPr/>
+        </p:nvSpPr>
+        <p:spPr>
+          <a:xfrm>
+            <a:off x="9903125" y="5598543"/>
+            <a:ext cx="792317" cy="1148897"/>
+          </a:xfrm>
+          <a:custGeom>
+            <a:avLst/>
+            <a:gdLst>
+              <a:gd name="connsiteX0" fmla="*/ 0 w 792317"/>
+              <a:gd name="connsiteY0" fmla="*/ 0 h 1148897"/>
+              <a:gd name="connsiteX1" fmla="*/ 284671 w 792317"/>
+              <a:gd name="connsiteY1" fmla="*/ 491706 h 1148897"/>
+              <a:gd name="connsiteX2" fmla="*/ 112143 w 792317"/>
+              <a:gd name="connsiteY2" fmla="*/ 931653 h 1148897"/>
+              <a:gd name="connsiteX3" fmla="*/ 224286 w 792317"/>
+              <a:gd name="connsiteY3" fmla="*/ 1147314 h 1148897"/>
+              <a:gd name="connsiteX4" fmla="*/ 759124 w 792317"/>
+              <a:gd name="connsiteY4" fmla="*/ 1035170 h 1148897"/>
+              <a:gd name="connsiteX5" fmla="*/ 690113 w 792317"/>
+              <a:gd name="connsiteY5" fmla="*/ 1147314 h 1148897"/>
+            </a:gdLst>
+            <a:ahLst/>
+            <a:cxnLst>
+              <a:cxn ang="0">
+                <a:pos x="connsiteX0" y="connsiteY0"/>
+              </a:cxn>
+              <a:cxn ang="0">
+                <a:pos x="connsiteX1" y="connsiteY1"/>
+              </a:cxn>
+              <a:cxn ang="0">
+                <a:pos x="connsiteX2" y="connsiteY2"/>
+              </a:cxn>
+              <a:cxn ang="0">
+                <a:pos x="connsiteX3" y="connsiteY3"/>
+              </a:cxn>
+              <a:cxn ang="0">
+                <a:pos x="connsiteX4" y="connsiteY4"/>
+              </a:cxn>
+              <a:cxn ang="0">
+                <a:pos x="connsiteX5" y="connsiteY5"/>
+              </a:cxn>
+            </a:cxnLst>
+            <a:rect l="l" t="t" r="r" b="b"/>
+            <a:pathLst>
+              <a:path w="792317" h="1148897">
+                <a:moveTo>
+                  <a:pt x="0" y="0"/>
+                </a:moveTo>
+                <a:cubicBezTo>
+                  <a:pt x="132990" y="168215"/>
+                  <a:pt x="265980" y="336430"/>
+                  <a:pt x="284671" y="491706"/>
+                </a:cubicBezTo>
+                <a:cubicBezTo>
+                  <a:pt x="303362" y="646982"/>
+                  <a:pt x="122207" y="822385"/>
+                  <a:pt x="112143" y="931653"/>
+                </a:cubicBezTo>
+                <a:cubicBezTo>
+                  <a:pt x="102079" y="1040921"/>
+                  <a:pt x="116456" y="1130061"/>
+                  <a:pt x="224286" y="1147314"/>
+                </a:cubicBezTo>
+                <a:cubicBezTo>
+                  <a:pt x="332116" y="1164567"/>
+                  <a:pt x="681486" y="1035170"/>
+                  <a:pt x="759124" y="1035170"/>
+                </a:cubicBezTo>
+                <a:cubicBezTo>
+                  <a:pt x="836762" y="1035170"/>
+                  <a:pt x="763437" y="1091242"/>
+                  <a:pt x="690113" y="1147314"/>
+                </a:cubicBezTo>
+              </a:path>
+            </a:pathLst>
+          </a:custGeom>
+        </p:spPr>
+        <p:style>
+          <a:lnRef idx="1">
+            <a:schemeClr val="dk1"/>
+          </a:lnRef>
+          <a:fillRef idx="0">
+            <a:schemeClr val="dk1"/>
+          </a:fillRef>
+          <a:effectRef idx="0">
+            <a:schemeClr val="dk1"/>
+          </a:effectRef>
+          <a:fontRef idx="minor">
+            <a:schemeClr val="tx1"/>
+          </a:fontRef>
+        </p:style>
+        <p:txBody>
+          <a:bodyPr rtlCol="0" anchor="ctr"/>
+          <a:lstStyle/>
+          <a:p>
+            <a:pPr algn="ctr"/>
+            <a:endParaRPr lang="en-GB"/>
+          </a:p>
+        </p:txBody>
+      </p:sp>
+      <p:sp>
+        <p:nvSpPr>
+          <p:cNvPr id="5" name="Freeform: Shape 4"/>
+          <p:cNvSpPr/>
+          <p:nvPr/>
+        </p:nvSpPr>
+        <p:spPr>
+          <a:xfrm>
+            <a:off x="10692412" y="5669280"/>
+            <a:ext cx="1177688" cy="967943"/>
+          </a:xfrm>
+          <a:custGeom>
+            <a:avLst/>
+            <a:gdLst>
+              <a:gd name="connsiteX0" fmla="*/ 67028 w 1177688"/>
+              <a:gd name="connsiteY0" fmla="*/ 0 h 967943"/>
+              <a:gd name="connsiteX1" fmla="*/ 28928 w 1177688"/>
+              <a:gd name="connsiteY1" fmla="*/ 259080 h 967943"/>
+              <a:gd name="connsiteX2" fmla="*/ 440408 w 1177688"/>
+              <a:gd name="connsiteY2" fmla="*/ 800100 h 967943"/>
+              <a:gd name="connsiteX3" fmla="*/ 897608 w 1177688"/>
+              <a:gd name="connsiteY3" fmla="*/ 853440 h 967943"/>
+              <a:gd name="connsiteX4" fmla="*/ 1141448 w 1177688"/>
+              <a:gd name="connsiteY4" fmla="*/ 967740 h 967943"/>
+              <a:gd name="connsiteX5" fmla="*/ 1171928 w 1177688"/>
+              <a:gd name="connsiteY5" fmla="*/ 822960 h 967943"/>
+            </a:gdLst>
+            <a:ahLst/>
+            <a:cxnLst>
+              <a:cxn ang="0">
+                <a:pos x="connsiteX0" y="connsiteY0"/>
+              </a:cxn>
+              <a:cxn ang="0">
+                <a:pos x="connsiteX1" y="connsiteY1"/>
+              </a:cxn>
+              <a:cxn ang="0">
+                <a:pos x="connsiteX2" y="connsiteY2"/>
+              </a:cxn>
+              <a:cxn ang="0">
+                <a:pos x="connsiteX3" y="connsiteY3"/>
+              </a:cxn>
+              <a:cxn ang="0">
+                <a:pos x="connsiteX4" y="connsiteY4"/>
+              </a:cxn>
+              <a:cxn ang="0">
+                <a:pos x="connsiteX5" y="connsiteY5"/>
+              </a:cxn>
+            </a:cxnLst>
+            <a:rect l="l" t="t" r="r" b="b"/>
+            <a:pathLst>
+              <a:path w="1177688" h="967943">
+                <a:moveTo>
+                  <a:pt x="67028" y="0"/>
+                </a:moveTo>
+                <a:cubicBezTo>
+                  <a:pt x="16863" y="62865"/>
+                  <a:pt x="-33302" y="125730"/>
+                  <a:pt x="28928" y="259080"/>
+                </a:cubicBezTo>
+                <a:cubicBezTo>
+                  <a:pt x="91158" y="392430"/>
+                  <a:pt x="295628" y="701040"/>
+                  <a:pt x="440408" y="800100"/>
+                </a:cubicBezTo>
+                <a:cubicBezTo>
+                  <a:pt x="585188" y="899160"/>
+                  <a:pt x="780768" y="825500"/>
+                  <a:pt x="897608" y="853440"/>
+                </a:cubicBezTo>
+                <a:cubicBezTo>
+                  <a:pt x="1014448" y="881380"/>
+                  <a:pt x="1095728" y="972820"/>
+                  <a:pt x="1141448" y="967740"/>
+                </a:cubicBezTo>
+                <a:cubicBezTo>
+                  <a:pt x="1187168" y="962660"/>
+                  <a:pt x="1179548" y="892810"/>
+                  <a:pt x="1171928" y="822960"/>
+                </a:cubicBezTo>
+              </a:path>
+            </a:pathLst>
+          </a:custGeom>
+        </p:spPr>
+        <p:style>
+          <a:lnRef idx="1">
+            <a:schemeClr val="dk1"/>
+          </a:lnRef>
+          <a:fillRef idx="0">
+            <a:schemeClr val="dk1"/>
+          </a:fillRef>
+          <a:effectRef idx="0">
+            <a:schemeClr val="dk1"/>
+          </a:effectRef>
+          <a:fontRef idx="minor">
+            <a:schemeClr val="tx1"/>
+          </a:fontRef>
+        </p:style>
+        <p:txBody>
+          <a:bodyPr rtlCol="0" anchor="ctr"/>
+          <a:lstStyle/>
+          <a:p>
+            <a:pPr algn="ctr"/>
+            <a:endParaRPr lang="en-GB"/>
           </a:p>
         </p:txBody>
       </p:sp>
@@ -15135,6 +15594,47 @@
           </a:p>
         </p:txBody>
       </p:sp>
+      <p:pic>
+        <p:nvPicPr>
+          <p:cNvPr id="5122" name="Picture 2" descr="http://helenwillsher.com/wp-content/uploads/2013/08/stockfresh_2195796_developing-skills_sizeXS.jpg"/>
+          <p:cNvPicPr>
+            <a:picLocks noChangeAspect="1" noChangeArrowheads="1"/>
+          </p:cNvPicPr>
+          <p:nvPr/>
+        </p:nvPicPr>
+        <p:blipFill>
+          <a:blip r:embed="rId2">
+            <a:extLst>
+              <a:ext uri="{28A0092B-C50C-407E-A947-70E740481C1C}">
+                <a14:useLocalDpi xmlns:a14="http://schemas.microsoft.com/office/drawing/2010/main" val="0"/>
+              </a:ext>
+            </a:extLst>
+          </a:blip>
+          <a:srcRect/>
+          <a:stretch>
+            <a:fillRect/>
+          </a:stretch>
+        </p:blipFill>
+        <p:spPr bwMode="auto">
+          <a:xfrm>
+            <a:off x="7884634" y="3462247"/>
+            <a:ext cx="3686175" cy="2952750"/>
+          </a:xfrm>
+          <a:prstGeom prst="rect">
+            <a:avLst/>
+          </a:prstGeom>
+          <a:noFill/>
+          <a:extLst>
+            <a:ext uri="{909E8E84-426E-40DD-AFC4-6F175D3DCCD1}">
+              <a14:hiddenFill xmlns:a14="http://schemas.microsoft.com/office/drawing/2010/main">
+                <a:solidFill>
+                  <a:srgbClr val="FFFFFF"/>
+                </a:solidFill>
+              </a14:hiddenFill>
+            </a:ext>
+          </a:extLst>
+        </p:spPr>
+      </p:pic>
     </p:spTree>
     <p:extLst>
       <p:ext uri="{BB962C8B-B14F-4D97-AF65-F5344CB8AC3E}">
@@ -15293,7 +15793,7 @@
         </p:blipFill>
         <p:spPr>
           <a:xfrm>
-            <a:off x="5820924" y="2507827"/>
+            <a:off x="6438144" y="2784826"/>
             <a:ext cx="4818023" cy="3451860"/>
           </a:xfrm>
           <a:prstGeom prst="rect">

</xml_diff>